<commit_message>
info blobs, about page, scrolldeck
i’m tired.
</commit_message>
<xml_diff>
--- a/CS115_Presentation.pptx
+++ b/CS115_Presentation.pptx
@@ -5,7 +5,7 @@
     <p:sldMasterId id="2147483654" r:id="rId1"/>
   </p:sldMasterIdLst>
   <p:notesMasterIdLst>
-    <p:notesMasterId r:id="rId15"/>
+    <p:notesMasterId r:id="rId14"/>
   </p:notesMasterIdLst>
   <p:sldIdLst>
     <p:sldId id="256" r:id="rId2"/>
@@ -20,7 +20,6 @@
     <p:sldId id="266" r:id="rId11"/>
     <p:sldId id="267" r:id="rId12"/>
     <p:sldId id="268" r:id="rId13"/>
-    <p:sldId id="260" r:id="rId14"/>
   </p:sldIdLst>
   <p:sldSz cx="9144000" cy="5143500" type="screen16x9"/>
   <p:notesSz cx="6858000" cy="9144000"/>
@@ -3439,26 +3438,13 @@
             </a:pPr>
             <a:r>
               <a:rPr lang="en-US" dirty="0" smtClean="0"/>
-              <a:t>Setting up rails</a:t>
-            </a:r>
-          </a:p>
-          <a:p>
-            <a:pPr marL="457200" indent="-457200">
-              <a:buFont typeface="Arial"/>
-              <a:buChar char="•"/>
-            </a:pPr>
-            <a:r>
-              <a:rPr lang="en-US" dirty="0" smtClean="0"/>
-              <a:t>Settings up </a:t>
+              <a:t>Setting up rails/</a:t>
             </a:r>
             <a:r>
               <a:rPr lang="en-US" dirty="0" err="1" smtClean="0"/>
               <a:t>postgres</a:t>
             </a:r>
-            <a:r>
-              <a:rPr lang="en-US" dirty="0" smtClean="0"/>
-              <a:t> with rails</a:t>
-            </a:r>
+            <a:endParaRPr lang="en-US" dirty="0" smtClean="0"/>
           </a:p>
           <a:p>
             <a:pPr marL="457200" indent="-457200">
@@ -3587,13 +3573,8 @@
             </a:pPr>
             <a:r>
               <a:rPr lang="en-US" dirty="0" smtClean="0"/>
-              <a:t>Change your </a:t>
-            </a:r>
-            <a:r>
-              <a:rPr lang="en-US" smtClean="0"/>
-              <a:t>tires frequently</a:t>
-            </a:r>
-            <a:endParaRPr lang="en-US" dirty="0" smtClean="0"/>
+              <a:t>Change your tires frequently</a:t>
+            </a:r>
           </a:p>
           <a:p>
             <a:endParaRPr lang="en-US" dirty="0"/>
@@ -3610,425 +3591,6 @@
   <p:clrMapOvr>
     <a:masterClrMapping/>
   </p:clrMapOvr>
-</p:sld>
-</file>
-
-<file path=ppt/slides/slide13.xml><?xml version="1.0" encoding="utf-8"?>
-<p:sld xmlns:a="http://schemas.openxmlformats.org/drawingml/2006/main" xmlns:r="http://schemas.openxmlformats.org/officeDocument/2006/relationships" xmlns:p="http://schemas.openxmlformats.org/presentationml/2006/main">
-  <p:cSld>
-    <p:spTree>
-      <p:nvGrpSpPr>
-        <p:cNvPr id="1" name=""/>
-        <p:cNvGrpSpPr/>
-        <p:nvPr/>
-      </p:nvGrpSpPr>
-      <p:grpSpPr>
-        <a:xfrm>
-          <a:off x="0" y="0"/>
-          <a:ext cx="0" cy="0"/>
-          <a:chOff x="0" y="0"/>
-          <a:chExt cx="0" cy="0"/>
-        </a:xfrm>
-      </p:grpSpPr>
-      <p:sp>
-        <p:nvSpPr>
-          <p:cNvPr id="2" name="Title 1"/>
-          <p:cNvSpPr>
-            <a:spLocks noGrp="1"/>
-          </p:cNvSpPr>
-          <p:nvPr>
-            <p:ph type="title"/>
-          </p:nvPr>
-        </p:nvSpPr>
-        <p:spPr/>
-        <p:txBody>
-          <a:bodyPr/>
-          <a:lstStyle/>
-          <a:p>
-            <a:r>
-              <a:rPr lang="en-US" dirty="0" smtClean="0"/>
-              <a:t>Release Plan</a:t>
-            </a:r>
-            <a:endParaRPr lang="en-US" dirty="0"/>
-          </a:p>
-        </p:txBody>
-      </p:sp>
-      <p:sp>
-        <p:nvSpPr>
-          <p:cNvPr id="3" name="Text Placeholder 2"/>
-          <p:cNvSpPr>
-            <a:spLocks noGrp="1"/>
-          </p:cNvSpPr>
-          <p:nvPr>
-            <p:ph type="body" idx="1"/>
-          </p:nvPr>
-        </p:nvSpPr>
-        <p:spPr/>
-        <p:txBody>
-          <a:bodyPr numCol="3"/>
-          <a:lstStyle/>
-          <a:p>
-            <a:endParaRPr lang="en-US" dirty="0" smtClean="0"/>
-          </a:p>
-          <a:p>
-            <a:pPr marL="457200" indent="-457200">
-              <a:buFont typeface="Arial"/>
-              <a:buChar char="•"/>
-            </a:pPr>
-            <a:endParaRPr lang="en-US" dirty="0"/>
-          </a:p>
-        </p:txBody>
-      </p:sp>
-      <p:graphicFrame>
-        <p:nvGraphicFramePr>
-          <p:cNvPr id="4" name="Table 3"/>
-          <p:cNvGraphicFramePr>
-            <a:graphicFrameLocks noGrp="1"/>
-          </p:cNvGraphicFramePr>
-          <p:nvPr>
-            <p:extLst>
-              <p:ext uri="{D42A27DB-BD31-4B8C-83A1-F6EECF244321}">
-                <p14:modId xmlns:p14="http://schemas.microsoft.com/office/powerpoint/2010/main" val="1375206044"/>
-              </p:ext>
-            </p:extLst>
-          </p:nvPr>
-        </p:nvGraphicFramePr>
-        <p:xfrm>
-          <a:off x="253999" y="1204797"/>
-          <a:ext cx="8636001" cy="3768676"/>
-        </p:xfrm>
-        <a:graphic>
-          <a:graphicData uri="http://schemas.openxmlformats.org/drawingml/2006/table">
-            <a:tbl>
-              <a:tblPr firstRow="1" bandRow="1"/>
-              <a:tblGrid>
-                <a:gridCol w="873126"/>
-                <a:gridCol w="3309938"/>
-                <a:gridCol w="4452937"/>
-              </a:tblGrid>
-              <a:tr h="507317">
-                <a:tc>
-                  <a:txBody>
-                    <a:bodyPr/>
-                    <a:lstStyle/>
-                    <a:p>
-                      <a:r>
-                        <a:rPr lang="en-US" dirty="0" smtClean="0"/>
-                        <a:t>Sprints</a:t>
-                      </a:r>
-                      <a:endParaRPr lang="en-US" dirty="0"/>
-                    </a:p>
-                  </a:txBody>
-                  <a:tcPr/>
-                </a:tc>
-                <a:tc>
-                  <a:txBody>
-                    <a:bodyPr/>
-                    <a:lstStyle/>
-                    <a:p>
-                      <a:r>
-                        <a:rPr lang="en-US" dirty="0" smtClean="0"/>
-                        <a:t>High Level Goals</a:t>
-                      </a:r>
-                      <a:endParaRPr lang="en-US" dirty="0"/>
-                    </a:p>
-                  </a:txBody>
-                  <a:tcPr/>
-                </a:tc>
-                <a:tc>
-                  <a:txBody>
-                    <a:bodyPr/>
-                    <a:lstStyle/>
-                    <a:p>
-                      <a:r>
-                        <a:rPr lang="en-US" dirty="0" smtClean="0"/>
-                        <a:t>User Stories</a:t>
-                      </a:r>
-                      <a:endParaRPr lang="en-US" dirty="0"/>
-                    </a:p>
-                  </a:txBody>
-                  <a:tcPr/>
-                </a:tc>
-              </a:tr>
-              <a:tr h="1537163">
-                <a:tc>
-                  <a:txBody>
-                    <a:bodyPr/>
-                    <a:lstStyle/>
-                    <a:p>
-                      <a:r>
-                        <a:rPr lang="en-US" dirty="0" smtClean="0"/>
-                        <a:t>Sprint</a:t>
-                      </a:r>
-                      <a:r>
-                        <a:rPr lang="en-US" baseline="0" dirty="0" smtClean="0"/>
-                        <a:t> 1</a:t>
-                      </a:r>
-                      <a:endParaRPr lang="en-US" dirty="0"/>
-                    </a:p>
-                  </a:txBody>
-                  <a:tcPr/>
-                </a:tc>
-                <a:tc>
-                  <a:txBody>
-                    <a:bodyPr/>
-                    <a:lstStyle/>
-                    <a:p>
-                      <a:pPr marL="285750" indent="-285750">
-                        <a:buFontTx/>
-                        <a:buChar char="-"/>
-                      </a:pPr>
-                      <a:r>
-                        <a:rPr lang="en-US" dirty="0" smtClean="0"/>
-                        <a:t>Learn ruby on rails.</a:t>
-                      </a:r>
-                      <a:endParaRPr lang="en-US" baseline="0" dirty="0" smtClean="0"/>
-                    </a:p>
-                    <a:p>
-                      <a:pPr marL="285750" indent="-285750">
-                        <a:buFontTx/>
-                        <a:buChar char="-"/>
-                      </a:pPr>
-                      <a:r>
-                        <a:rPr lang="en-US" baseline="0" dirty="0" smtClean="0"/>
-                        <a:t>Create the layout for the index page and host it locally </a:t>
-                      </a:r>
-                    </a:p>
-                    <a:p>
-                      <a:pPr marL="285750" indent="-285750">
-                        <a:buFontTx/>
-                        <a:buChar char="-"/>
-                      </a:pPr>
-                      <a:r>
-                        <a:rPr lang="en-US" baseline="0" dirty="0" smtClean="0"/>
-                        <a:t>Add images/videos and combine all pages into the one page and format/index them</a:t>
-                      </a:r>
-                    </a:p>
-                    <a:p>
-                      <a:pPr marL="0" indent="0">
-                        <a:buFontTx/>
-                        <a:buNone/>
-                      </a:pPr>
-                      <a:endParaRPr lang="en-US" baseline="0" dirty="0" smtClean="0"/>
-                    </a:p>
-                  </a:txBody>
-                  <a:tcPr/>
-                </a:tc>
-                <a:tc>
-                  <a:txBody>
-                    <a:bodyPr/>
-                    <a:lstStyle/>
-                    <a:p>
-                      <a:pPr marL="285750" indent="-285750">
-                        <a:buFontTx/>
-                        <a:buChar char="-"/>
-                      </a:pPr>
-                      <a:r>
-                        <a:rPr lang="en-US" dirty="0" smtClean="0"/>
-                        <a:t>As a</a:t>
-                      </a:r>
-                      <a:r>
-                        <a:rPr lang="en-US" baseline="0" dirty="0" smtClean="0"/>
-                        <a:t> potential customer, I want to see the costs/benefits of using Classroom Hero to decide to use it</a:t>
-                      </a:r>
-                    </a:p>
-                    <a:p>
-                      <a:pPr marL="285750" indent="-285750">
-                        <a:buFontTx/>
-                        <a:buChar char="-"/>
-                      </a:pPr>
-                      <a:r>
-                        <a:rPr lang="en-US" baseline="0" dirty="0" smtClean="0"/>
-                        <a:t>As a potential customer I want a tutorial to see how Classroom Hero is used</a:t>
-                      </a:r>
-                    </a:p>
-                  </a:txBody>
-                  <a:tcPr/>
-                </a:tc>
-              </a:tr>
-              <a:tr h="696230">
-                <a:tc>
-                  <a:txBody>
-                    <a:bodyPr/>
-                    <a:lstStyle/>
-                    <a:p>
-                      <a:r>
-                        <a:rPr lang="en-US" dirty="0" smtClean="0"/>
-                        <a:t>Sprint 2</a:t>
-                      </a:r>
-                      <a:endParaRPr lang="en-US" dirty="0"/>
-                    </a:p>
-                  </a:txBody>
-                  <a:tcPr/>
-                </a:tc>
-                <a:tc>
-                  <a:txBody>
-                    <a:bodyPr/>
-                    <a:lstStyle/>
-                    <a:p>
-                      <a:pPr marL="285750" indent="-285750">
-                        <a:buFontTx/>
-                        <a:buChar char="-"/>
-                      </a:pPr>
-                      <a:r>
-                        <a:rPr lang="en-US" dirty="0" smtClean="0"/>
-                        <a:t>Interactive sign up tutorial</a:t>
-                      </a:r>
-                    </a:p>
-                    <a:p>
-                      <a:pPr marL="285750" indent="-285750">
-                        <a:buFontTx/>
-                        <a:buChar char="-"/>
-                      </a:pPr>
-                      <a:r>
-                        <a:rPr lang="en-US" dirty="0" smtClean="0"/>
-                        <a:t>Informational tutorial</a:t>
-                      </a:r>
-                      <a:endParaRPr lang="en-US" dirty="0"/>
-                    </a:p>
-                  </a:txBody>
-                  <a:tcPr/>
-                </a:tc>
-                <a:tc>
-                  <a:txBody>
-                    <a:bodyPr/>
-                    <a:lstStyle/>
-                    <a:p>
-                      <a:pPr marL="285750" indent="-285750">
-                        <a:buFontTx/>
-                        <a:buChar char="-"/>
-                      </a:pPr>
-                      <a:r>
-                        <a:rPr lang="en-US" dirty="0" smtClean="0"/>
-                        <a:t>As a potential</a:t>
-                      </a:r>
-                      <a:r>
-                        <a:rPr lang="en-US" baseline="0" dirty="0" smtClean="0"/>
-                        <a:t> customer, I want a tutorial to learn about classroom hero</a:t>
-                      </a:r>
-                    </a:p>
-                    <a:p>
-                      <a:pPr marL="285750" indent="-285750">
-                        <a:buFontTx/>
-                        <a:buChar char="-"/>
-                      </a:pPr>
-                      <a:r>
-                        <a:rPr lang="en-US" baseline="0" dirty="0" smtClean="0"/>
-                        <a:t>As a teacher making an account, I want an interactive tutorial that helps/informs me</a:t>
-                      </a:r>
-                      <a:endParaRPr lang="en-US" dirty="0"/>
-                    </a:p>
-                  </a:txBody>
-                  <a:tcPr/>
-                </a:tc>
-              </a:tr>
-              <a:tr h="696230">
-                <a:tc>
-                  <a:txBody>
-                    <a:bodyPr/>
-                    <a:lstStyle/>
-                    <a:p>
-                      <a:r>
-                        <a:rPr lang="en-US" dirty="0" smtClean="0"/>
-                        <a:t>Sprint 3</a:t>
-                      </a:r>
-                      <a:endParaRPr lang="en-US" dirty="0"/>
-                    </a:p>
-                  </a:txBody>
-                  <a:tcPr/>
-                </a:tc>
-                <a:tc>
-                  <a:txBody>
-                    <a:bodyPr/>
-                    <a:lstStyle/>
-                    <a:p>
-                      <a:pPr marL="285750" indent="-285750">
-                        <a:buFontTx/>
-                        <a:buChar char="-"/>
-                      </a:pPr>
-                      <a:r>
-                        <a:rPr lang="en-US" baseline="0" dirty="0" smtClean="0"/>
-                        <a:t>Set up teacher home page</a:t>
-                      </a:r>
-                    </a:p>
-                    <a:p>
-                      <a:pPr marL="285750" indent="-285750">
-                        <a:buFontTx/>
-                        <a:buChar char="-"/>
-                      </a:pPr>
-                      <a:r>
-                        <a:rPr lang="en-US" dirty="0" smtClean="0"/>
-                        <a:t>Add</a:t>
-                      </a:r>
-                      <a:r>
-                        <a:rPr lang="en-US" baseline="0" dirty="0" smtClean="0"/>
-                        <a:t> edit account settings</a:t>
-                      </a:r>
-                    </a:p>
-                    <a:p>
-                      <a:pPr marL="285750" indent="-285750">
-                        <a:buFontTx/>
-                        <a:buChar char="-"/>
-                      </a:pPr>
-                      <a:r>
-                        <a:rPr lang="en-US" baseline="0" dirty="0" smtClean="0"/>
-                        <a:t>Add statistical readouts</a:t>
-                      </a:r>
-                      <a:endParaRPr lang="en-US" dirty="0"/>
-                    </a:p>
-                  </a:txBody>
-                  <a:tcPr/>
-                </a:tc>
-                <a:tc>
-                  <a:txBody>
-                    <a:bodyPr/>
-                    <a:lstStyle/>
-                    <a:p>
-                      <a:pPr marL="285750" indent="-285750">
-                        <a:buFontTx/>
-                        <a:buChar char="-"/>
-                      </a:pPr>
-                      <a:r>
-                        <a:rPr lang="en-US" baseline="0" dirty="0" smtClean="0"/>
-                        <a:t>As a teacher, I want to edit my account settings</a:t>
-                      </a:r>
-                    </a:p>
-                    <a:p>
-                      <a:pPr marL="285750" indent="-285750">
-                        <a:buFontTx/>
-                        <a:buChar char="-"/>
-                      </a:pPr>
-                      <a:r>
-                        <a:rPr lang="en-US" baseline="0" dirty="0" smtClean="0"/>
-                        <a:t>As a teacher, I want to see statistical readouts to see how my students are doing</a:t>
-                      </a:r>
-                      <a:endParaRPr lang="en-US" dirty="0"/>
-                    </a:p>
-                  </a:txBody>
-                  <a:tcPr/>
-                </a:tc>
-              </a:tr>
-            </a:tbl>
-          </a:graphicData>
-        </a:graphic>
-      </p:graphicFrame>
-    </p:spTree>
-    <p:extLst>
-      <p:ext uri="{BB962C8B-B14F-4D97-AF65-F5344CB8AC3E}">
-        <p14:creationId xmlns:p14="http://schemas.microsoft.com/office/powerpoint/2010/main" val="97768245"/>
-      </p:ext>
-    </p:extLst>
-  </p:cSld>
-  <p:clrMapOvr>
-    <a:masterClrMapping/>
-  </p:clrMapOvr>
-  <p:timing>
-    <p:tnLst>
-      <p:par>
-        <p:cTn xmlns:p14="http://schemas.microsoft.com/office/powerpoint/2010/main" id="1" dur="indefinite" restart="never" nodeType="tmRoot"/>
-      </p:par>
-    </p:tnLst>
-  </p:timing>
 </p:sld>
 </file>
 
@@ -4447,16 +4009,12 @@
               <a:buChar char="●"/>
             </a:pPr>
             <a:r>
+              <a:rPr lang="en-US" smtClean="0"/>
+              <a:t>Re-design </a:t>
+            </a:r>
+            <a:r>
               <a:rPr lang="en-US" dirty="0"/>
-              <a:t>R</a:t>
-            </a:r>
-            <a:r>
-              <a:rPr lang="en-US" dirty="0" smtClean="0"/>
-              <a:t>e </a:t>
-            </a:r>
-            <a:r>
-              <a:rPr lang="en-US" dirty="0"/>
-              <a:t>design the front end for the Classroom Hero website with rails and bootstrap. </a:t>
+              <a:t>the front end for the Classroom Hero website with rails and bootstrap. </a:t>
             </a:r>
             <a:endParaRPr lang="en" dirty="0"/>
           </a:p>

</xml_diff>